<commit_message>
Comparatifs projet 1 et 2
</commit_message>
<xml_diff>
--- a/Présentation/STI_Schowing_Zharkova.pptx
+++ b/Présentation/STI_Schowing_Zharkova.pptx
@@ -5,7 +5,7 @@
     <p:sldMasterId id="2147483672" r:id="rId1"/>
   </p:sldMasterIdLst>
   <p:notesMasterIdLst>
-    <p:notesMasterId r:id="rId20"/>
+    <p:notesMasterId r:id="rId22"/>
   </p:notesMasterIdLst>
   <p:sldIdLst>
     <p:sldId id="256" r:id="rId2"/>
@@ -23,9 +23,11 @@
     <p:sldId id="271" r:id="rId14"/>
     <p:sldId id="272" r:id="rId15"/>
     <p:sldId id="268" r:id="rId16"/>
-    <p:sldId id="269" r:id="rId17"/>
-    <p:sldId id="270" r:id="rId18"/>
-    <p:sldId id="274" r:id="rId19"/>
+    <p:sldId id="275" r:id="rId17"/>
+    <p:sldId id="276" r:id="rId18"/>
+    <p:sldId id="269" r:id="rId19"/>
+    <p:sldId id="270" r:id="rId20"/>
+    <p:sldId id="274" r:id="rId21"/>
   </p:sldIdLst>
   <p:sldSz cx="12192000" cy="6858000"/>
   <p:notesSz cx="6858000" cy="9144000"/>
@@ -214,7 +216,7 @@
           <a:p>
             <a:fld id="{819AF0D5-B885-4406-8851-7EF283C420B2}" type="datetimeFigureOut">
               <a:rPr lang="fr-CH" smtClean="0"/>
-              <a:t>20.01.2017</a:t>
+              <a:t>21.01.2017</a:t>
             </a:fld>
             <a:endParaRPr lang="fr-CH" dirty="0"/>
           </a:p>
@@ -2179,7 +2181,7 @@
           <a:p>
             <a:fld id="{904BA411-5B63-457F-BE8A-5F0DD7FCAD39}" type="datetimeFigureOut">
               <a:rPr lang="fr-CH" smtClean="0"/>
-              <a:t>20.01.2017</a:t>
+              <a:t>21.01.2017</a:t>
             </a:fld>
             <a:endParaRPr lang="fr-CH" dirty="0"/>
           </a:p>
@@ -2430,7 +2432,7 @@
           <a:p>
             <a:fld id="{904BA411-5B63-457F-BE8A-5F0DD7FCAD39}" type="datetimeFigureOut">
               <a:rPr lang="fr-CH" smtClean="0"/>
-              <a:t>20.01.2017</a:t>
+              <a:t>21.01.2017</a:t>
             </a:fld>
             <a:endParaRPr lang="fr-CH" dirty="0"/>
           </a:p>
@@ -2744,7 +2746,7 @@
           <a:p>
             <a:fld id="{904BA411-5B63-457F-BE8A-5F0DD7FCAD39}" type="datetimeFigureOut">
               <a:rPr lang="fr-CH" smtClean="0"/>
-              <a:t>20.01.2017</a:t>
+              <a:t>21.01.2017</a:t>
             </a:fld>
             <a:endParaRPr lang="fr-CH" dirty="0"/>
           </a:p>
@@ -3085,7 +3087,7 @@
           <a:p>
             <a:fld id="{904BA411-5B63-457F-BE8A-5F0DD7FCAD39}" type="datetimeFigureOut">
               <a:rPr lang="fr-CH" smtClean="0"/>
-              <a:t>20.01.2017</a:t>
+              <a:t>21.01.2017</a:t>
             </a:fld>
             <a:endParaRPr lang="fr-CH" dirty="0"/>
           </a:p>
@@ -3399,7 +3401,7 @@
           <a:p>
             <a:fld id="{904BA411-5B63-457F-BE8A-5F0DD7FCAD39}" type="datetimeFigureOut">
               <a:rPr lang="fr-CH" smtClean="0"/>
-              <a:t>20.01.2017</a:t>
+              <a:t>21.01.2017</a:t>
             </a:fld>
             <a:endParaRPr lang="fr-CH" dirty="0"/>
           </a:p>
@@ -3792,7 +3794,7 @@
           <a:p>
             <a:fld id="{904BA411-5B63-457F-BE8A-5F0DD7FCAD39}" type="datetimeFigureOut">
               <a:rPr lang="fr-CH" smtClean="0"/>
-              <a:t>20.01.2017</a:t>
+              <a:t>21.01.2017</a:t>
             </a:fld>
             <a:endParaRPr lang="fr-CH" dirty="0"/>
           </a:p>
@@ -3962,7 +3964,7 @@
           <a:p>
             <a:fld id="{904BA411-5B63-457F-BE8A-5F0DD7FCAD39}" type="datetimeFigureOut">
               <a:rPr lang="fr-CH" smtClean="0"/>
-              <a:t>20.01.2017</a:t>
+              <a:t>21.01.2017</a:t>
             </a:fld>
             <a:endParaRPr lang="fr-CH" dirty="0"/>
           </a:p>
@@ -4142,7 +4144,7 @@
           <a:p>
             <a:fld id="{904BA411-5B63-457F-BE8A-5F0DD7FCAD39}" type="datetimeFigureOut">
               <a:rPr lang="fr-CH" smtClean="0"/>
-              <a:t>20.01.2017</a:t>
+              <a:t>21.01.2017</a:t>
             </a:fld>
             <a:endParaRPr lang="fr-CH" dirty="0"/>
           </a:p>
@@ -4318,7 +4320,7 @@
           <a:p>
             <a:fld id="{904BA411-5B63-457F-BE8A-5F0DD7FCAD39}" type="datetimeFigureOut">
               <a:rPr lang="fr-CH" smtClean="0"/>
-              <a:t>20.01.2017</a:t>
+              <a:t>21.01.2017</a:t>
             </a:fld>
             <a:endParaRPr lang="fr-CH" dirty="0"/>
           </a:p>
@@ -4565,7 +4567,7 @@
           <a:p>
             <a:fld id="{904BA411-5B63-457F-BE8A-5F0DD7FCAD39}" type="datetimeFigureOut">
               <a:rPr lang="fr-CH" smtClean="0"/>
-              <a:t>20.01.2017</a:t>
+              <a:t>21.01.2017</a:t>
             </a:fld>
             <a:endParaRPr lang="fr-CH" dirty="0"/>
           </a:p>
@@ -4797,7 +4799,7 @@
           <a:p>
             <a:fld id="{904BA411-5B63-457F-BE8A-5F0DD7FCAD39}" type="datetimeFigureOut">
               <a:rPr lang="fr-CH" smtClean="0"/>
-              <a:t>20.01.2017</a:t>
+              <a:t>21.01.2017</a:t>
             </a:fld>
             <a:endParaRPr lang="fr-CH" dirty="0"/>
           </a:p>
@@ -5171,7 +5173,7 @@
           <a:p>
             <a:fld id="{904BA411-5B63-457F-BE8A-5F0DD7FCAD39}" type="datetimeFigureOut">
               <a:rPr lang="fr-CH" smtClean="0"/>
-              <a:t>20.01.2017</a:t>
+              <a:t>21.01.2017</a:t>
             </a:fld>
             <a:endParaRPr lang="fr-CH" dirty="0"/>
           </a:p>
@@ -5294,7 +5296,7 @@
           <a:p>
             <a:fld id="{904BA411-5B63-457F-BE8A-5F0DD7FCAD39}" type="datetimeFigureOut">
               <a:rPr lang="fr-CH" smtClean="0"/>
-              <a:t>20.01.2017</a:t>
+              <a:t>21.01.2017</a:t>
             </a:fld>
             <a:endParaRPr lang="fr-CH" dirty="0"/>
           </a:p>
@@ -5389,7 +5391,7 @@
           <a:p>
             <a:fld id="{904BA411-5B63-457F-BE8A-5F0DD7FCAD39}" type="datetimeFigureOut">
               <a:rPr lang="fr-CH" smtClean="0"/>
-              <a:t>20.01.2017</a:t>
+              <a:t>21.01.2017</a:t>
             </a:fld>
             <a:endParaRPr lang="fr-CH" dirty="0"/>
           </a:p>
@@ -5644,7 +5646,7 @@
           <a:p>
             <a:fld id="{904BA411-5B63-457F-BE8A-5F0DD7FCAD39}" type="datetimeFigureOut">
               <a:rPr lang="fr-CH" smtClean="0"/>
-              <a:t>20.01.2017</a:t>
+              <a:t>21.01.2017</a:t>
             </a:fld>
             <a:endParaRPr lang="fr-CH" dirty="0"/>
           </a:p>
@@ -5907,7 +5909,7 @@
           <a:p>
             <a:fld id="{904BA411-5B63-457F-BE8A-5F0DD7FCAD39}" type="datetimeFigureOut">
               <a:rPr lang="fr-CH" smtClean="0"/>
-              <a:t>20.01.2017</a:t>
+              <a:t>21.01.2017</a:t>
             </a:fld>
             <a:endParaRPr lang="fr-CH" dirty="0"/>
           </a:p>
@@ -6650,7 +6652,7 @@
           <a:p>
             <a:fld id="{904BA411-5B63-457F-BE8A-5F0DD7FCAD39}" type="datetimeFigureOut">
               <a:rPr lang="fr-CH" smtClean="0"/>
-              <a:t>20.01.2017</a:t>
+              <a:t>21.01.2017</a:t>
             </a:fld>
             <a:endParaRPr lang="fr-CH" dirty="0"/>
           </a:p>
@@ -8559,13 +8561,8 @@
           <a:p>
             <a:r>
               <a:rPr lang="fr-CH" dirty="0"/>
-              <a:t>Analyse de menaces - </a:t>
-            </a:r>
-            <a:r>
-              <a:rPr lang="fr-CH" dirty="0"/>
-              <a:t>Scénario d’attaques</a:t>
-            </a:r>
-            <a:endParaRPr lang="fr-CH" dirty="0"/>
+              <a:t>Analyse de menaces - Scénario d’attaques</a:t>
+            </a:r>
           </a:p>
         </p:txBody>
       </p:sp>
@@ -8816,13 +8813,8 @@
           <a:p>
             <a:r>
               <a:rPr lang="fr-CH" dirty="0"/>
-              <a:t>Analyse de menaces - </a:t>
-            </a:r>
-            <a:r>
-              <a:rPr lang="fr-CH" dirty="0"/>
-              <a:t>Scénario d’attaques</a:t>
-            </a:r>
-            <a:endParaRPr lang="fr-CH" dirty="0"/>
+              <a:t>Analyse de menaces - Scénario d’attaques</a:t>
+            </a:r>
           </a:p>
         </p:txBody>
       </p:sp>
@@ -9011,13 +9003,8 @@
           <a:p>
             <a:r>
               <a:rPr lang="fr-CH" dirty="0"/>
-              <a:t>Analyse de menaces - </a:t>
-            </a:r>
-            <a:r>
-              <a:rPr lang="fr-CH" dirty="0"/>
-              <a:t>Scénario d’attaques</a:t>
-            </a:r>
-            <a:endParaRPr lang="fr-CH" dirty="0"/>
+              <a:t>Analyse de menaces - Scénario d’attaques</a:t>
+            </a:r>
           </a:p>
         </p:txBody>
       </p:sp>
@@ -9406,76 +9393,39 @@
           <a:p>
             <a:r>
               <a:rPr lang="fr-CH" dirty="0"/>
-              <a:t>À améliorer</a:t>
-            </a:r>
-          </a:p>
-        </p:txBody>
-      </p:sp>
-      <p:sp>
-        <p:nvSpPr>
-          <p:cNvPr id="3" name="Espace réservé du contenu 2"/>
-          <p:cNvSpPr>
-            <a:spLocks noGrp="1"/>
-          </p:cNvSpPr>
-          <p:nvPr>
-            <p:ph idx="1"/>
-          </p:nvPr>
-        </p:nvSpPr>
-        <p:spPr/>
-        <p:txBody>
-          <a:bodyPr/>
-          <a:lstStyle/>
-          <a:p>
-            <a:r>
-              <a:rPr lang="fr-CH" dirty="0"/>
-              <a:t>Configurer SSL/TLS (et autre gestion de HTTP niveau serveur)</a:t>
-            </a:r>
-          </a:p>
-          <a:p>
-            <a:r>
-              <a:rPr lang="fr-CH" dirty="0"/>
-              <a:t>Améliorer la politique de mots de passe (caractères, validité, nombre de tentatives fausse, </a:t>
-            </a:r>
-            <a:r>
-              <a:rPr lang="fr-CH" dirty="0" err="1"/>
-              <a:t>etc</a:t>
-            </a:r>
-            <a:r>
-              <a:rPr lang="fr-CH" dirty="0"/>
-              <a:t> ...)</a:t>
-            </a:r>
-          </a:p>
-          <a:p>
-            <a:r>
-              <a:rPr lang="fr-CH" dirty="0" err="1"/>
-              <a:t>Captcha</a:t>
-            </a:r>
-            <a:r>
-              <a:rPr lang="fr-CH" dirty="0"/>
-              <a:t> plus complexe</a:t>
-            </a:r>
-          </a:p>
-          <a:p>
-            <a:r>
-              <a:rPr lang="fr-CH" dirty="0"/>
-              <a:t>Gestion des redirections lors d’erreur 404 ou d’accès (ne pas divulguer d’informations)</a:t>
-            </a:r>
-          </a:p>
-          <a:p>
-            <a:endParaRPr lang="fr-CH" dirty="0"/>
-          </a:p>
-          <a:p>
-            <a:endParaRPr lang="fr-CH" dirty="0"/>
-          </a:p>
-          <a:p>
-            <a:endParaRPr lang="fr-CH" dirty="0"/>
-          </a:p>
-        </p:txBody>
-      </p:sp>
+              <a:t>Comparaison</a:t>
+            </a:r>
+          </a:p>
+        </p:txBody>
+      </p:sp>
+      <p:pic>
+        <p:nvPicPr>
+          <p:cNvPr id="4" name="Image 3"/>
+          <p:cNvPicPr>
+            <a:picLocks noChangeAspect="1"/>
+          </p:cNvPicPr>
+          <p:nvPr/>
+        </p:nvPicPr>
+        <p:blipFill>
+          <a:blip r:embed="rId2"/>
+          <a:stretch>
+            <a:fillRect/>
+          </a:stretch>
+        </p:blipFill>
+        <p:spPr>
+          <a:xfrm>
+            <a:off x="0" y="2937711"/>
+            <a:ext cx="12192000" cy="3920289"/>
+          </a:xfrm>
+          <a:prstGeom prst="rect">
+            <a:avLst/>
+          </a:prstGeom>
+        </p:spPr>
+      </p:pic>
     </p:spTree>
     <p:extLst>
       <p:ext uri="{BB962C8B-B14F-4D97-AF65-F5344CB8AC3E}">
-        <p14:creationId xmlns:p14="http://schemas.microsoft.com/office/powerpoint/2010/main" val="2365029829"/>
+        <p14:creationId xmlns:p14="http://schemas.microsoft.com/office/powerpoint/2010/main" val="2164413112"/>
       </p:ext>
     </p:extLst>
   </p:cSld>
@@ -9512,59 +9462,98 @@
             <p:ph type="title"/>
           </p:nvPr>
         </p:nvSpPr>
-        <p:spPr/>
+        <p:spPr>
+          <a:xfrm>
+            <a:off x="677334" y="609600"/>
+            <a:ext cx="8596668" cy="1320800"/>
+          </a:xfrm>
+        </p:spPr>
         <p:txBody>
           <a:bodyPr/>
           <a:lstStyle/>
           <a:p>
             <a:r>
               <a:rPr lang="fr-CH" dirty="0"/>
-              <a:t>Conclusion</a:t>
-            </a:r>
-          </a:p>
-        </p:txBody>
-      </p:sp>
-      <p:sp>
-        <p:nvSpPr>
-          <p:cNvPr id="3" name="Espace réservé du contenu 2"/>
-          <p:cNvSpPr>
-            <a:spLocks noGrp="1"/>
-          </p:cNvSpPr>
-          <p:nvPr>
-            <p:ph idx="1"/>
-          </p:nvPr>
-        </p:nvSpPr>
-        <p:spPr/>
-        <p:txBody>
-          <a:bodyPr/>
-          <a:lstStyle/>
-          <a:p>
-            <a:r>
-              <a:rPr lang="fr-CH" dirty="0"/>
-              <a:t>La sécurité est présente à tous les niveaux (code PHP, configuration serveur, logique machine,…) </a:t>
-            </a:r>
-          </a:p>
-          <a:p>
-            <a:r>
-              <a:rPr lang="fr-CH" dirty="0"/>
-              <a:t>Bon début dans ce projet </a:t>
-            </a:r>
-            <a:r>
-              <a:rPr lang="fr-CH" dirty="0">
-                <a:sym typeface="Wingdings" panose="05000000000000000000" pitchFamily="2" charset="2"/>
-              </a:rPr>
-              <a:t> </a:t>
-            </a:r>
-          </a:p>
-          <a:p>
-            <a:endParaRPr lang="fr-CH" dirty="0"/>
-          </a:p>
-        </p:txBody>
-      </p:sp>
+              <a:t>Comparaison</a:t>
+            </a:r>
+          </a:p>
+        </p:txBody>
+      </p:sp>
+      <p:pic>
+        <p:nvPicPr>
+          <p:cNvPr id="3" name="Image 2"/>
+          <p:cNvPicPr>
+            <a:picLocks noChangeAspect="1"/>
+          </p:cNvPicPr>
+          <p:nvPr/>
+        </p:nvPicPr>
+        <p:blipFill>
+          <a:blip r:embed="rId2"/>
+          <a:stretch>
+            <a:fillRect/>
+          </a:stretch>
+        </p:blipFill>
+        <p:spPr>
+          <a:xfrm>
+            <a:off x="-58189" y="3576280"/>
+            <a:ext cx="12192000" cy="3281720"/>
+          </a:xfrm>
+          <a:prstGeom prst="rect">
+            <a:avLst/>
+          </a:prstGeom>
+        </p:spPr>
+      </p:pic>
+      <p:pic>
+        <p:nvPicPr>
+          <p:cNvPr id="5" name="Image 4"/>
+          <p:cNvPicPr>
+            <a:picLocks noChangeAspect="1"/>
+          </p:cNvPicPr>
+          <p:nvPr/>
+        </p:nvPicPr>
+        <p:blipFill rotWithShape="1">
+          <a:blip r:embed="rId3"/>
+          <a:srcRect l="1" r="15682" b="-23811"/>
+          <a:stretch/>
+        </p:blipFill>
+        <p:spPr>
+          <a:xfrm>
+            <a:off x="936740" y="2653327"/>
+            <a:ext cx="2770736" cy="247650"/>
+          </a:xfrm>
+          <a:prstGeom prst="rect">
+            <a:avLst/>
+          </a:prstGeom>
+        </p:spPr>
+      </p:pic>
+      <p:pic>
+        <p:nvPicPr>
+          <p:cNvPr id="6" name="Image 5"/>
+          <p:cNvPicPr>
+            <a:picLocks noChangeAspect="1"/>
+          </p:cNvPicPr>
+          <p:nvPr/>
+        </p:nvPicPr>
+        <p:blipFill>
+          <a:blip r:embed="rId4"/>
+          <a:stretch>
+            <a:fillRect/>
+          </a:stretch>
+        </p:blipFill>
+        <p:spPr>
+          <a:xfrm>
+            <a:off x="4975668" y="2629515"/>
+            <a:ext cx="4886325" cy="247650"/>
+          </a:xfrm>
+          <a:prstGeom prst="rect">
+            <a:avLst/>
+          </a:prstGeom>
+        </p:spPr>
+      </p:pic>
     </p:spTree>
     <p:extLst>
       <p:ext uri="{BB962C8B-B14F-4D97-AF65-F5344CB8AC3E}">
-        <p14:creationId xmlns:p14="http://schemas.microsoft.com/office/powerpoint/2010/main" val="243168118"/>
+        <p14:creationId xmlns:p14="http://schemas.microsoft.com/office/powerpoint/2010/main" val="1204713096"/>
       </p:ext>
     </p:extLst>
   </p:cSld>
@@ -9608,15 +9597,165 @@
           <a:p>
             <a:r>
               <a:rPr lang="fr-CH" dirty="0"/>
-              <a:t>Questions ?</a:t>
-            </a:r>
+              <a:t>À améliorer</a:t>
+            </a:r>
+          </a:p>
+        </p:txBody>
+      </p:sp>
+      <p:sp>
+        <p:nvSpPr>
+          <p:cNvPr id="3" name="Espace réservé du contenu 2"/>
+          <p:cNvSpPr>
+            <a:spLocks noGrp="1"/>
+          </p:cNvSpPr>
+          <p:nvPr>
+            <p:ph idx="1"/>
+          </p:nvPr>
+        </p:nvSpPr>
+        <p:spPr/>
+        <p:txBody>
+          <a:bodyPr/>
+          <a:lstStyle/>
+          <a:p>
+            <a:r>
+              <a:rPr lang="fr-CH" dirty="0"/>
+              <a:t>Configurer SSL/TLS (et autre gestion de HTTP niveau serveur)</a:t>
+            </a:r>
+          </a:p>
+          <a:p>
+            <a:r>
+              <a:rPr lang="fr-CH" dirty="0"/>
+              <a:t>Améliorer la politique de mots de passe (caractères, validité, nombre de tentatives fausse, </a:t>
+            </a:r>
+            <a:r>
+              <a:rPr lang="fr-CH" dirty="0" err="1"/>
+              <a:t>etc</a:t>
+            </a:r>
+            <a:r>
+              <a:rPr lang="fr-CH" dirty="0"/>
+              <a:t> ...)</a:t>
+            </a:r>
+          </a:p>
+          <a:p>
+            <a:r>
+              <a:rPr lang="fr-CH" dirty="0" err="1"/>
+              <a:t>Captcha</a:t>
+            </a:r>
+            <a:r>
+              <a:rPr lang="fr-CH" dirty="0"/>
+              <a:t> plus complexe</a:t>
+            </a:r>
+          </a:p>
+          <a:p>
+            <a:r>
+              <a:rPr lang="fr-CH" dirty="0"/>
+              <a:t>Gestion des redirections lors d’erreur 404 ou d’accès (ne pas divulguer d’informations)</a:t>
+            </a:r>
+          </a:p>
+          <a:p>
+            <a:endParaRPr lang="fr-CH" dirty="0"/>
+          </a:p>
+          <a:p>
+            <a:endParaRPr lang="fr-CH" dirty="0"/>
+          </a:p>
+          <a:p>
+            <a:endParaRPr lang="fr-CH" dirty="0"/>
           </a:p>
         </p:txBody>
       </p:sp>
     </p:spTree>
     <p:extLst>
       <p:ext uri="{BB962C8B-B14F-4D97-AF65-F5344CB8AC3E}">
-        <p14:creationId xmlns:p14="http://schemas.microsoft.com/office/powerpoint/2010/main" val="4103472513"/>
+        <p14:creationId xmlns:p14="http://schemas.microsoft.com/office/powerpoint/2010/main" val="2365029829"/>
+      </p:ext>
+    </p:extLst>
+  </p:cSld>
+  <p:clrMapOvr>
+    <a:masterClrMapping/>
+  </p:clrMapOvr>
+</p:sld>
+</file>
+
+<file path=ppt/slides/slide19.xml><?xml version="1.0" encoding="utf-8"?>
+<p:sld xmlns:a="http://schemas.openxmlformats.org/drawingml/2006/main" xmlns:r="http://schemas.openxmlformats.org/officeDocument/2006/relationships" xmlns:p="http://schemas.openxmlformats.org/presentationml/2006/main">
+  <p:cSld>
+    <p:spTree>
+      <p:nvGrpSpPr>
+        <p:cNvPr id="1" name=""/>
+        <p:cNvGrpSpPr/>
+        <p:nvPr/>
+      </p:nvGrpSpPr>
+      <p:grpSpPr>
+        <a:xfrm>
+          <a:off x="0" y="0"/>
+          <a:ext cx="0" cy="0"/>
+          <a:chOff x="0" y="0"/>
+          <a:chExt cx="0" cy="0"/>
+        </a:xfrm>
+      </p:grpSpPr>
+      <p:sp>
+        <p:nvSpPr>
+          <p:cNvPr id="2" name="Titre 1"/>
+          <p:cNvSpPr>
+            <a:spLocks noGrp="1"/>
+          </p:cNvSpPr>
+          <p:nvPr>
+            <p:ph type="title"/>
+          </p:nvPr>
+        </p:nvSpPr>
+        <p:spPr/>
+        <p:txBody>
+          <a:bodyPr/>
+          <a:lstStyle/>
+          <a:p>
+            <a:r>
+              <a:rPr lang="fr-CH" dirty="0"/>
+              <a:t>Conclusion</a:t>
+            </a:r>
+          </a:p>
+        </p:txBody>
+      </p:sp>
+      <p:sp>
+        <p:nvSpPr>
+          <p:cNvPr id="3" name="Espace réservé du contenu 2"/>
+          <p:cNvSpPr>
+            <a:spLocks noGrp="1"/>
+          </p:cNvSpPr>
+          <p:nvPr>
+            <p:ph idx="1"/>
+          </p:nvPr>
+        </p:nvSpPr>
+        <p:spPr/>
+        <p:txBody>
+          <a:bodyPr/>
+          <a:lstStyle/>
+          <a:p>
+            <a:r>
+              <a:rPr lang="fr-CH" dirty="0"/>
+              <a:t>La sécurité est présente à tous les niveaux (code PHP, configuration serveur, logique machine,…) </a:t>
+            </a:r>
+          </a:p>
+          <a:p>
+            <a:r>
+              <a:rPr lang="fr-CH" dirty="0"/>
+              <a:t>Bon début dans ce projet </a:t>
+            </a:r>
+            <a:r>
+              <a:rPr lang="fr-CH" dirty="0">
+                <a:sym typeface="Wingdings" panose="05000000000000000000" pitchFamily="2" charset="2"/>
+              </a:rPr>
+              <a:t> </a:t>
+            </a:r>
+          </a:p>
+          <a:p>
+            <a:endParaRPr lang="fr-CH" dirty="0"/>
+          </a:p>
+        </p:txBody>
+      </p:sp>
+    </p:spTree>
+    <p:extLst>
+      <p:ext uri="{BB962C8B-B14F-4D97-AF65-F5344CB8AC3E}">
+        <p14:creationId xmlns:p14="http://schemas.microsoft.com/office/powerpoint/2010/main" val="243168118"/>
       </p:ext>
     </p:extLst>
   </p:cSld>
@@ -9727,6 +9866,58 @@
     <p:extLst>
       <p:ext uri="{BB962C8B-B14F-4D97-AF65-F5344CB8AC3E}">
         <p14:creationId xmlns:p14="http://schemas.microsoft.com/office/powerpoint/2010/main" val="1688419058"/>
+      </p:ext>
+    </p:extLst>
+  </p:cSld>
+  <p:clrMapOvr>
+    <a:masterClrMapping/>
+  </p:clrMapOvr>
+</p:sld>
+</file>
+
+<file path=ppt/slides/slide20.xml><?xml version="1.0" encoding="utf-8"?>
+<p:sld xmlns:a="http://schemas.openxmlformats.org/drawingml/2006/main" xmlns:r="http://schemas.openxmlformats.org/officeDocument/2006/relationships" xmlns:p="http://schemas.openxmlformats.org/presentationml/2006/main">
+  <p:cSld>
+    <p:spTree>
+      <p:nvGrpSpPr>
+        <p:cNvPr id="1" name=""/>
+        <p:cNvGrpSpPr/>
+        <p:nvPr/>
+      </p:nvGrpSpPr>
+      <p:grpSpPr>
+        <a:xfrm>
+          <a:off x="0" y="0"/>
+          <a:ext cx="0" cy="0"/>
+          <a:chOff x="0" y="0"/>
+          <a:chExt cx="0" cy="0"/>
+        </a:xfrm>
+      </p:grpSpPr>
+      <p:sp>
+        <p:nvSpPr>
+          <p:cNvPr id="2" name="Titre 1"/>
+          <p:cNvSpPr>
+            <a:spLocks noGrp="1"/>
+          </p:cNvSpPr>
+          <p:nvPr>
+            <p:ph type="title"/>
+          </p:nvPr>
+        </p:nvSpPr>
+        <p:spPr/>
+        <p:txBody>
+          <a:bodyPr/>
+          <a:lstStyle/>
+          <a:p>
+            <a:r>
+              <a:rPr lang="fr-CH" dirty="0"/>
+              <a:t>Questions ?</a:t>
+            </a:r>
+          </a:p>
+        </p:txBody>
+      </p:sp>
+    </p:spTree>
+    <p:extLst>
+      <p:ext uri="{BB962C8B-B14F-4D97-AF65-F5344CB8AC3E}">
+        <p14:creationId xmlns:p14="http://schemas.microsoft.com/office/powerpoint/2010/main" val="4103472513"/>
       </p:ext>
     </p:extLst>
   </p:cSld>
@@ -10438,7 +10629,6 @@
               <a:rPr lang="fr-CH" dirty="0"/>
               <a:t>Potentialité : haute</a:t>
             </a:r>
-            <a:endParaRPr lang="fr-CH" dirty="0"/>
           </a:p>
           <a:p>
             <a:r>
@@ -10475,7 +10665,6 @@
               <a:rPr lang="fr-CH" dirty="0"/>
               <a:t>Potentialité : moyenne</a:t>
             </a:r>
-            <a:endParaRPr lang="fr-CH" dirty="0"/>
           </a:p>
           <a:p>
             <a:endParaRPr lang="fr-CH" dirty="0"/>

</xml_diff>

<commit_message>
That's all folks !
</commit_message>
<xml_diff>
--- a/Présentation/STI_Schowing_Zharkova.pptx
+++ b/Présentation/STI_Schowing_Zharkova.pptx
@@ -530,14 +530,13 @@
           <a:p>
             <a:r>
               <a:rPr lang="fr-CH" dirty="0"/>
-              <a:t>TODO:</a:t>
-            </a:r>
-            <a:br>
-              <a:rPr lang="fr-CH" dirty="0"/>
-            </a:br>
-            <a:r>
-              <a:rPr lang="fr-CH" dirty="0"/>
-              <a:t>CSRF -&gt; implémenté partiellement (non fonctionnel)</a:t>
+              <a:t>La première partie de ce projet a été réalisée par Sébastien Henneberger et Thibault Schowing (déjà notée)</a:t>
+            </a:r>
+          </a:p>
+          <a:p>
+            <a:r>
+              <a:rPr lang="fr-CH" dirty="0"/>
+              <a:t>La seconde partie, celle présentée dans ce Powerpoint, a été réalisée par Anastasia Zharkova et Thibault Schowing et consiste à sécuriser la partie 1.</a:t>
             </a:r>
           </a:p>
           <a:p>

</xml_diff>

<commit_message>
J'adore le poulet !
</commit_message>
<xml_diff>
--- a/Présentation/STI_Schowing_Zharkova.pptx
+++ b/Présentation/STI_Schowing_Zharkova.pptx
@@ -217,7 +217,7 @@
           <a:p>
             <a:fld id="{819AF0D5-B885-4406-8851-7EF283C420B2}" type="datetimeFigureOut">
               <a:rPr lang="fr-CH" smtClean="0"/>
-              <a:t>24.01.2017</a:t>
+              <a:t>25.01.2017</a:t>
             </a:fld>
             <a:endParaRPr lang="fr-CH" dirty="0"/>
           </a:p>
@@ -1934,10 +1934,9 @@
           <a:lstStyle/>
           <a:p>
             <a:r>
-              <a:rPr lang="fr-CH" dirty="0" err="1"/>
-              <a:t>Nastya</a:t>
-            </a:r>
-            <a:endParaRPr lang="fr-CH" dirty="0"/>
+              <a:rPr lang="fr-CH" dirty="0"/>
+              <a:t>Thibault</a:t>
+            </a:r>
           </a:p>
         </p:txBody>
       </p:sp>
@@ -2126,10 +2125,9 @@
           <a:lstStyle/>
           <a:p>
             <a:r>
-              <a:rPr lang="fr-CH" dirty="0" err="1"/>
-              <a:t>Nastya</a:t>
-            </a:r>
-            <a:endParaRPr lang="fr-CH" dirty="0"/>
+              <a:rPr lang="fr-CH" dirty="0"/>
+              <a:t>Thibault</a:t>
+            </a:r>
           </a:p>
         </p:txBody>
       </p:sp>
@@ -2644,9 +2642,10 @@
           <a:lstStyle/>
           <a:p>
             <a:r>
-              <a:rPr lang="fr-CH" dirty="0"/>
-              <a:t>Thibault</a:t>
-            </a:r>
+              <a:rPr lang="fr-CH" dirty="0" err="1"/>
+              <a:t>Nastya</a:t>
+            </a:r>
+            <a:endParaRPr lang="fr-CH" dirty="0"/>
           </a:p>
           <a:p>
             <a:endParaRPr lang="fr-CH" dirty="0"/>
@@ -2742,10 +2741,30 @@
           <a:bodyPr/>
           <a:lstStyle/>
           <a:p>
+            <a:pPr marL="0" marR="0" lvl="0" indent="0" algn="l" defTabSz="914400" rtl="0" eaLnBrk="1" fontAlgn="auto" latinLnBrk="0" hangingPunct="1">
+              <a:lnSpc>
+                <a:spcPct val="100000"/>
+              </a:lnSpc>
+              <a:spcBef>
+                <a:spcPts val="0"/>
+              </a:spcBef>
+              <a:spcAft>
+                <a:spcPts val="0"/>
+              </a:spcAft>
+              <a:buClrTx/>
+              <a:buSzTx/>
+              <a:buFontTx/>
+              <a:buNone/>
+              <a:tabLst/>
+              <a:defRPr/>
+            </a:pPr>
             <a:r>
               <a:rPr lang="fr-CH" dirty="0" err="1"/>
-              <a:t>Thibalt</a:t>
-            </a:r>
+              <a:t>Nastya</a:t>
+            </a:r>
+            <a:endParaRPr lang="fr-CH" dirty="0"/>
+          </a:p>
+          <a:p>
             <a:endParaRPr lang="fr-CH" dirty="0"/>
           </a:p>
         </p:txBody>
@@ -2830,10 +2849,31 @@
           <a:bodyPr/>
           <a:lstStyle/>
           <a:p>
-            <a:r>
-              <a:rPr lang="fr-CH" dirty="0"/>
-              <a:t>Thibault</a:t>
-            </a:r>
+            <a:pPr marL="0" marR="0" lvl="0" indent="0" algn="l" defTabSz="914400" rtl="0" eaLnBrk="1" fontAlgn="auto" latinLnBrk="0" hangingPunct="1">
+              <a:lnSpc>
+                <a:spcPct val="100000"/>
+              </a:lnSpc>
+              <a:spcBef>
+                <a:spcPts val="0"/>
+              </a:spcBef>
+              <a:spcAft>
+                <a:spcPts val="0"/>
+              </a:spcAft>
+              <a:buClrTx/>
+              <a:buSzTx/>
+              <a:buFontTx/>
+              <a:buNone/>
+              <a:tabLst/>
+              <a:defRPr/>
+            </a:pPr>
+            <a:r>
+              <a:rPr lang="fr-CH" dirty="0" err="1"/>
+              <a:t>Nastya</a:t>
+            </a:r>
+            <a:endParaRPr lang="fr-CH" dirty="0"/>
+          </a:p>
+          <a:p>
+            <a:endParaRPr lang="fr-CH" dirty="0"/>
           </a:p>
         </p:txBody>
       </p:sp>
@@ -3683,7 +3723,7 @@
           <a:p>
             <a:fld id="{904BA411-5B63-457F-BE8A-5F0DD7FCAD39}" type="datetimeFigureOut">
               <a:rPr lang="fr-CH" smtClean="0"/>
-              <a:t>24.01.2017</a:t>
+              <a:t>25.01.2017</a:t>
             </a:fld>
             <a:endParaRPr lang="fr-CH" dirty="0"/>
           </a:p>
@@ -3934,7 +3974,7 @@
           <a:p>
             <a:fld id="{904BA411-5B63-457F-BE8A-5F0DD7FCAD39}" type="datetimeFigureOut">
               <a:rPr lang="fr-CH" smtClean="0"/>
-              <a:t>24.01.2017</a:t>
+              <a:t>25.01.2017</a:t>
             </a:fld>
             <a:endParaRPr lang="fr-CH" dirty="0"/>
           </a:p>
@@ -4248,7 +4288,7 @@
           <a:p>
             <a:fld id="{904BA411-5B63-457F-BE8A-5F0DD7FCAD39}" type="datetimeFigureOut">
               <a:rPr lang="fr-CH" smtClean="0"/>
-              <a:t>24.01.2017</a:t>
+              <a:t>25.01.2017</a:t>
             </a:fld>
             <a:endParaRPr lang="fr-CH" dirty="0"/>
           </a:p>
@@ -4589,7 +4629,7 @@
           <a:p>
             <a:fld id="{904BA411-5B63-457F-BE8A-5F0DD7FCAD39}" type="datetimeFigureOut">
               <a:rPr lang="fr-CH" smtClean="0"/>
-              <a:t>24.01.2017</a:t>
+              <a:t>25.01.2017</a:t>
             </a:fld>
             <a:endParaRPr lang="fr-CH" dirty="0"/>
           </a:p>
@@ -4903,7 +4943,7 @@
           <a:p>
             <a:fld id="{904BA411-5B63-457F-BE8A-5F0DD7FCAD39}" type="datetimeFigureOut">
               <a:rPr lang="fr-CH" smtClean="0"/>
-              <a:t>24.01.2017</a:t>
+              <a:t>25.01.2017</a:t>
             </a:fld>
             <a:endParaRPr lang="fr-CH" dirty="0"/>
           </a:p>
@@ -5296,7 +5336,7 @@
           <a:p>
             <a:fld id="{904BA411-5B63-457F-BE8A-5F0DD7FCAD39}" type="datetimeFigureOut">
               <a:rPr lang="fr-CH" smtClean="0"/>
-              <a:t>24.01.2017</a:t>
+              <a:t>25.01.2017</a:t>
             </a:fld>
             <a:endParaRPr lang="fr-CH" dirty="0"/>
           </a:p>
@@ -5466,7 +5506,7 @@
           <a:p>
             <a:fld id="{904BA411-5B63-457F-BE8A-5F0DD7FCAD39}" type="datetimeFigureOut">
               <a:rPr lang="fr-CH" smtClean="0"/>
-              <a:t>24.01.2017</a:t>
+              <a:t>25.01.2017</a:t>
             </a:fld>
             <a:endParaRPr lang="fr-CH" dirty="0"/>
           </a:p>
@@ -5646,7 +5686,7 @@
           <a:p>
             <a:fld id="{904BA411-5B63-457F-BE8A-5F0DD7FCAD39}" type="datetimeFigureOut">
               <a:rPr lang="fr-CH" smtClean="0"/>
-              <a:t>24.01.2017</a:t>
+              <a:t>25.01.2017</a:t>
             </a:fld>
             <a:endParaRPr lang="fr-CH" dirty="0"/>
           </a:p>
@@ -5822,7 +5862,7 @@
           <a:p>
             <a:fld id="{904BA411-5B63-457F-BE8A-5F0DD7FCAD39}" type="datetimeFigureOut">
               <a:rPr lang="fr-CH" smtClean="0"/>
-              <a:t>24.01.2017</a:t>
+              <a:t>25.01.2017</a:t>
             </a:fld>
             <a:endParaRPr lang="fr-CH" dirty="0"/>
           </a:p>
@@ -6069,7 +6109,7 @@
           <a:p>
             <a:fld id="{904BA411-5B63-457F-BE8A-5F0DD7FCAD39}" type="datetimeFigureOut">
               <a:rPr lang="fr-CH" smtClean="0"/>
-              <a:t>24.01.2017</a:t>
+              <a:t>25.01.2017</a:t>
             </a:fld>
             <a:endParaRPr lang="fr-CH" dirty="0"/>
           </a:p>
@@ -6301,7 +6341,7 @@
           <a:p>
             <a:fld id="{904BA411-5B63-457F-BE8A-5F0DD7FCAD39}" type="datetimeFigureOut">
               <a:rPr lang="fr-CH" smtClean="0"/>
-              <a:t>24.01.2017</a:t>
+              <a:t>25.01.2017</a:t>
             </a:fld>
             <a:endParaRPr lang="fr-CH" dirty="0"/>
           </a:p>
@@ -6675,7 +6715,7 @@
           <a:p>
             <a:fld id="{904BA411-5B63-457F-BE8A-5F0DD7FCAD39}" type="datetimeFigureOut">
               <a:rPr lang="fr-CH" smtClean="0"/>
-              <a:t>24.01.2017</a:t>
+              <a:t>25.01.2017</a:t>
             </a:fld>
             <a:endParaRPr lang="fr-CH" dirty="0"/>
           </a:p>
@@ -6798,7 +6838,7 @@
           <a:p>
             <a:fld id="{904BA411-5B63-457F-BE8A-5F0DD7FCAD39}" type="datetimeFigureOut">
               <a:rPr lang="fr-CH" smtClean="0"/>
-              <a:t>24.01.2017</a:t>
+              <a:t>25.01.2017</a:t>
             </a:fld>
             <a:endParaRPr lang="fr-CH" dirty="0"/>
           </a:p>
@@ -6893,7 +6933,7 @@
           <a:p>
             <a:fld id="{904BA411-5B63-457F-BE8A-5F0DD7FCAD39}" type="datetimeFigureOut">
               <a:rPr lang="fr-CH" smtClean="0"/>
-              <a:t>24.01.2017</a:t>
+              <a:t>25.01.2017</a:t>
             </a:fld>
             <a:endParaRPr lang="fr-CH" dirty="0"/>
           </a:p>
@@ -7148,7 +7188,7 @@
           <a:p>
             <a:fld id="{904BA411-5B63-457F-BE8A-5F0DD7FCAD39}" type="datetimeFigureOut">
               <a:rPr lang="fr-CH" smtClean="0"/>
-              <a:t>24.01.2017</a:t>
+              <a:t>25.01.2017</a:t>
             </a:fld>
             <a:endParaRPr lang="fr-CH" dirty="0"/>
           </a:p>
@@ -7411,7 +7451,7 @@
           <a:p>
             <a:fld id="{904BA411-5B63-457F-BE8A-5F0DD7FCAD39}" type="datetimeFigureOut">
               <a:rPr lang="fr-CH" smtClean="0"/>
-              <a:t>24.01.2017</a:t>
+              <a:t>25.01.2017</a:t>
             </a:fld>
             <a:endParaRPr lang="fr-CH" dirty="0"/>
           </a:p>
@@ -8154,7 +8194,7 @@
           <a:p>
             <a:fld id="{904BA411-5B63-457F-BE8A-5F0DD7FCAD39}" type="datetimeFigureOut">
               <a:rPr lang="fr-CH" smtClean="0"/>
-              <a:t>24.01.2017</a:t>
+              <a:t>25.01.2017</a:t>
             </a:fld>
             <a:endParaRPr lang="fr-CH" dirty="0"/>
           </a:p>
@@ -11633,18 +11673,71 @@
             <p:ph type="title"/>
           </p:nvPr>
         </p:nvSpPr>
-        <p:spPr/>
-        <p:txBody>
-          <a:bodyPr/>
-          <a:lstStyle/>
-          <a:p>
-            <a:r>
-              <a:rPr lang="fr-CH" dirty="0"/>
-              <a:t>Questions ?</a:t>
-            </a:r>
-          </a:p>
-        </p:txBody>
-      </p:sp>
+        <p:spPr>
+          <a:xfrm>
+            <a:off x="432261" y="2028306"/>
+            <a:ext cx="6575367" cy="2527068"/>
+          </a:xfrm>
+        </p:spPr>
+        <p:txBody>
+          <a:bodyPr>
+            <a:normAutofit fontScale="90000"/>
+          </a:bodyPr>
+          <a:lstStyle/>
+          <a:p>
+            <a:r>
+              <a:rPr lang="az-Cyrl-AZ" sz="13800" dirty="0"/>
+              <a:t>Вопросы</a:t>
+            </a:r>
+            <a:r>
+              <a:rPr lang="fr-CH" sz="13800" dirty="0"/>
+              <a:t> </a:t>
+            </a:r>
+            <a:endParaRPr lang="fr-CH" sz="13800" dirty="0"/>
+          </a:p>
+        </p:txBody>
+      </p:sp>
+      <p:pic>
+        <p:nvPicPr>
+          <p:cNvPr id="1026" name="Picture 2" descr="Résultat de recherche d'images pour &quot;question mark logo&quot;"/>
+          <p:cNvPicPr>
+            <a:picLocks noChangeAspect="1" noChangeArrowheads="1"/>
+          </p:cNvPicPr>
+          <p:nvPr/>
+        </p:nvPicPr>
+        <p:blipFill>
+          <a:blip r:embed="rId3">
+            <a:extLst>
+              <a:ext uri="{28A0092B-C50C-407E-A947-70E740481C1C}">
+                <a14:useLocalDpi xmlns:a14="http://schemas.microsoft.com/office/drawing/2010/main" val="0"/>
+              </a:ext>
+            </a:extLst>
+          </a:blip>
+          <a:srcRect/>
+          <a:stretch>
+            <a:fillRect/>
+          </a:stretch>
+        </p:blipFill>
+        <p:spPr bwMode="auto">
+          <a:xfrm>
+            <a:off x="7102165" y="1571104"/>
+            <a:ext cx="2789980" cy="3200401"/>
+          </a:xfrm>
+          <a:prstGeom prst="rect">
+            <a:avLst/>
+          </a:prstGeom>
+          <a:noFill/>
+          <a:extLst>
+            <a:ext uri="{909E8E84-426E-40DD-AFC4-6F175D3DCCD1}">
+              <a14:hiddenFill xmlns:a14="http://schemas.microsoft.com/office/drawing/2010/main">
+                <a:solidFill>
+                  <a:srgbClr val="FFFFFF"/>
+                </a:solidFill>
+              </a14:hiddenFill>
+            </a:ext>
+          </a:extLst>
+        </p:spPr>
+      </p:pic>
     </p:spTree>
     <p:extLst>
       <p:ext uri="{BB962C8B-B14F-4D97-AF65-F5344CB8AC3E}">

</xml_diff>